<commit_message>
This is the status of the project as is required for Step 18 of the MSSA course. Further development of the data model, flashcard capabilities, and user authentication is required and next on the docket.
</commit_message>
<xml_diff>
--- a/Matt Moore Step 18.pptx
+++ b/Matt Moore Step 18.pptx
@@ -5014,15 +5014,7 @@
             </a:r>
             <a:r>
               <a:rPr lang="en-US" dirty="0"/>
-              <a:t> this point. I settled on a simple Term based framework to salvage </a:t>
-            </a:r>
-            <a:r>
-              <a:rPr lang="en-US" dirty="0" err="1"/>
-              <a:t>databse</a:t>
-            </a:r>
-            <a:r>
-              <a:rPr lang="en-US" dirty="0"/>
-              <a:t> functionality for this project. Moving forward, after User Authentication is added, I plan to re-attempt the user centric model.</a:t>
+              <a:t> this point. I settled on a simple Term based framework to salvage database functionality for this project. Moving forward, after User Authentication is added, I plan to re-attempt the user centric model.</a:t>
             </a:r>
           </a:p>
         </p:txBody>
@@ -5055,7 +5047,7 @@
           <a:graphicData uri="http://schemas.openxmlformats.org/presentationml/2006/ole">
             <mc:AlternateContent xmlns:mc="http://schemas.openxmlformats.org/markup-compatibility/2006">
               <mc:Choice xmlns:v="urn:schemas-microsoft-com:vml" Requires="v">
-                <p:oleObj spid="_x0000_s1027" name="Worksheet" r:id="rId3" imgW="6400800" imgH="6108700" progId="Excel.Sheet.12">
+                <p:oleObj spid="_x0000_s1029" name="Worksheet" r:id="rId3" imgW="6400800" imgH="6108700" progId="Excel.Sheet.12">
                   <p:embed/>
                 </p:oleObj>
               </mc:Choice>

</xml_diff>